<commit_message>
estoy seguro de este commit 1
</commit_message>
<xml_diff>
--- a/trim_2/1_gestion_proyecto/2_levantamiento_informacion/DiapositivasPresentaciónproyecto.pptx
+++ b/trim_2/1_gestion_proyecto/2_levantamiento_informacion/DiapositivasPresentaciónproyecto.pptx
@@ -271,7 +271,7 @@
           <a:p>
             <a:fld id="{1D8BD707-D9CF-40AE-B4C6-C98DA3205C09}" type="datetimeFigureOut">
               <a:rPr lang="en-US"/>
-              <a:t>4/9/2023</a:t>
+              <a:t>4/11/2023</a:t>
             </a:fld>
             <a:endParaRPr lang="en-US"/>
           </a:p>
@@ -446,7 +446,7 @@
           <a:p>
             <a:fld id="{1D8BD707-D9CF-40AE-B4C6-C98DA3205C09}" type="datetimeFigureOut">
               <a:rPr lang="en-US"/>
-              <a:t>4/9/2023</a:t>
+              <a:t>4/11/2023</a:t>
             </a:fld>
             <a:endParaRPr lang="en-US"/>
           </a:p>
@@ -660,7 +660,7 @@
           <a:p>
             <a:fld id="{1D8BD707-D9CF-40AE-B4C6-C98DA3205C09}" type="datetimeFigureOut">
               <a:rPr lang="en-US"/>
-              <a:t>4/9/2023</a:t>
+              <a:t>4/11/2023</a:t>
             </a:fld>
             <a:endParaRPr lang="en-US"/>
           </a:p>
@@ -845,7 +845,7 @@
           <a:p>
             <a:fld id="{1D8BD707-D9CF-40AE-B4C6-C98DA3205C09}" type="datetimeFigureOut">
               <a:rPr lang="en-US"/>
-              <a:t>4/9/2023</a:t>
+              <a:t>4/11/2023</a:t>
             </a:fld>
             <a:endParaRPr lang="en-US"/>
           </a:p>
@@ -1001,7 +1001,7 @@
           <a:p>
             <a:fld id="{1D8BD707-D9CF-40AE-B4C6-C98DA3205C09}" type="datetimeFigureOut">
               <a:rPr lang="en-US"/>
-              <a:t>4/9/2023</a:t>
+              <a:t>4/11/2023</a:t>
             </a:fld>
             <a:endParaRPr lang="en-US"/>
           </a:p>
@@ -1224,7 +1224,7 @@
           <a:p>
             <a:fld id="{1D8BD707-D9CF-40AE-B4C6-C98DA3205C09}" type="datetimeFigureOut">
               <a:rPr lang="en-US"/>
-              <a:t>4/9/2023</a:t>
+              <a:t>4/11/2023</a:t>
             </a:fld>
             <a:endParaRPr lang="en-US"/>
           </a:p>
@@ -1443,97 +1443,6 @@
           <a:chExt cx="0" cy="0"/>
         </a:xfrm>
       </p:grpSpPr>
-      <p:sp>
-        <p:nvSpPr>
-          <p:cNvPr id="2" name="object 2"/>
-          <p:cNvSpPr txBox="1">
-            <a:spLocks noGrp="1"/>
-          </p:cNvSpPr>
-          <p:nvPr>
-            <p:ph type="title"/>
-          </p:nvPr>
-        </p:nvSpPr>
-        <p:spPr>
-          <a:xfrm>
-            <a:off x="1074166" y="2551684"/>
-            <a:ext cx="4382135" cy="1671320"/>
-          </a:xfrm>
-          <a:prstGeom prst="rect">
-            <a:avLst/>
-          </a:prstGeom>
-        </p:spPr>
-        <p:txBody>
-          <a:bodyPr vert="horz" wrap="square" lIns="0" tIns="12700" rIns="0" bIns="0" rtlCol="0">
-            <a:spAutoFit/>
-          </a:bodyPr>
-          <a:lstStyle/>
-          <a:p>
-            <a:pPr marL="12700">
-              <a:lnSpc>
-                <a:spcPct val="100000"/>
-              </a:lnSpc>
-              <a:spcBef>
-                <a:spcPts val="100"/>
-              </a:spcBef>
-            </a:pPr>
-            <a:r>
-              <a:rPr sz="5400" b="1" spc="215" dirty="0">
-                <a:solidFill>
-                  <a:srgbClr val="404040"/>
-                </a:solidFill>
-                <a:latin typeface="Trebuchet MS"/>
-                <a:cs typeface="Trebuchet MS"/>
-              </a:rPr>
-              <a:t>Nombre</a:t>
-            </a:r>
-            <a:endParaRPr sz="5400">
-              <a:latin typeface="Trebuchet MS"/>
-              <a:cs typeface="Trebuchet MS"/>
-            </a:endParaRPr>
-          </a:p>
-          <a:p>
-            <a:pPr marL="12700">
-              <a:lnSpc>
-                <a:spcPct val="100000"/>
-              </a:lnSpc>
-            </a:pPr>
-            <a:r>
-              <a:rPr sz="5400" b="1" spc="200" dirty="0">
-                <a:solidFill>
-                  <a:srgbClr val="404040"/>
-                </a:solidFill>
-                <a:latin typeface="Trebuchet MS"/>
-                <a:cs typeface="Trebuchet MS"/>
-              </a:rPr>
-              <a:t>Del</a:t>
-            </a:r>
-            <a:r>
-              <a:rPr sz="5400" b="1" spc="-150" dirty="0">
-                <a:solidFill>
-                  <a:srgbClr val="404040"/>
-                </a:solidFill>
-                <a:latin typeface="Trebuchet MS"/>
-                <a:cs typeface="Trebuchet MS"/>
-              </a:rPr>
-              <a:t> </a:t>
-            </a:r>
-            <a:r>
-              <a:rPr sz="5400" b="1" spc="185" dirty="0">
-                <a:solidFill>
-                  <a:srgbClr val="404040"/>
-                </a:solidFill>
-                <a:latin typeface="Trebuchet MS"/>
-                <a:cs typeface="Trebuchet MS"/>
-              </a:rPr>
-              <a:t>Proyecto</a:t>
-            </a:r>
-            <a:endParaRPr sz="5400">
-              <a:latin typeface="Trebuchet MS"/>
-              <a:cs typeface="Trebuchet MS"/>
-            </a:endParaRPr>
-          </a:p>
-        </p:txBody>
-      </p:sp>
       <p:pic>
         <p:nvPicPr>
           <p:cNvPr id="6" name="Imagen 5" descr="Un dibujo de un perro&#10;&#10;Descripción generada automáticamente con confianza media">
@@ -1562,8 +1471,8 @@
         </p:blipFill>
         <p:spPr>
           <a:xfrm>
-            <a:off x="6096000" y="2860867"/>
-            <a:ext cx="2416890" cy="1136265"/>
+            <a:off x="2056788" y="1905001"/>
+            <a:ext cx="4521312" cy="2125628"/>
           </a:xfrm>
           <a:prstGeom prst="rect">
             <a:avLst/>
@@ -1598,8 +1507,8 @@
         </p:blipFill>
         <p:spPr>
           <a:xfrm>
-            <a:off x="8812359" y="2726763"/>
-            <a:ext cx="1671320" cy="1671320"/>
+            <a:off x="8077200" y="1913207"/>
+            <a:ext cx="2267375" cy="2267375"/>
           </a:xfrm>
           <a:prstGeom prst="rect">
             <a:avLst/>
@@ -2324,7 +2233,7 @@
         <p:spPr>
           <a:xfrm>
             <a:off x="4114800" y="3505200"/>
-            <a:ext cx="4114799" cy="1656864"/>
+            <a:ext cx="4114799" cy="1379865"/>
           </a:xfrm>
           <a:prstGeom prst="rect">
             <a:avLst/>
@@ -2335,36 +2244,6 @@
             <a:spAutoFit/>
           </a:bodyPr>
           <a:lstStyle/>
-          <a:p>
-            <a:pPr algn="l" rtl="0" fontAlgn="base"/>
-            <a:r>
-              <a:rPr lang="es-ES" sz="1800" b="0" i="0" dirty="0">
-                <a:solidFill>
-                  <a:schemeClr val="bg1"/>
-                </a:solidFill>
-                <a:effectLst/>
-                <a:latin typeface="Arial" panose="020B0604020202020204" pitchFamily="34" charset="0"/>
-              </a:rPr>
-              <a:t>Oscar Eliecer Ramírez Aguirre</a:t>
-            </a:r>
-            <a:r>
-              <a:rPr lang="es-ES" sz="1800" b="1" i="0" dirty="0">
-                <a:solidFill>
-                  <a:schemeClr val="bg1"/>
-                </a:solidFill>
-                <a:effectLst/>
-                <a:latin typeface="Arial" panose="020B0604020202020204" pitchFamily="34" charset="0"/>
-              </a:rPr>
-              <a:t> </a:t>
-            </a:r>
-            <a:endParaRPr lang="es-ES" sz="1600" b="1" i="0" dirty="0">
-              <a:solidFill>
-                <a:schemeClr val="bg1"/>
-              </a:solidFill>
-              <a:effectLst/>
-              <a:latin typeface="Segoe UI" panose="020B0502040204020203" pitchFamily="34" charset="0"/>
-            </a:endParaRPr>
-          </a:p>
           <a:p>
             <a:pPr algn="l" rtl="0" fontAlgn="base"/>
             <a:r>
@@ -4967,7 +4846,7 @@
         <p:spPr>
           <a:xfrm>
             <a:off x="609600" y="2105164"/>
-            <a:ext cx="11095355" cy="3990836"/>
+            <a:ext cx="11095355" cy="3744615"/>
           </a:xfrm>
           <a:prstGeom prst="rect">
             <a:avLst/>
@@ -4978,104 +4857,6 @@
             <a:spAutoFit/>
           </a:bodyPr>
           <a:lstStyle/>
-          <a:p>
-            <a:pPr marL="12700">
-              <a:lnSpc>
-                <a:spcPct val="100000"/>
-              </a:lnSpc>
-              <a:spcBef>
-                <a:spcPts val="100"/>
-              </a:spcBef>
-            </a:pPr>
-            <a:r>
-              <a:rPr sz="1600" spc="15" dirty="0">
-                <a:latin typeface="Trebuchet MS"/>
-                <a:cs typeface="Trebuchet MS"/>
-              </a:rPr>
-              <a:t>Párrafo </a:t>
-            </a:r>
-            <a:r>
-              <a:rPr sz="1600" spc="75" dirty="0">
-                <a:latin typeface="Trebuchet MS"/>
-                <a:cs typeface="Trebuchet MS"/>
-              </a:rPr>
-              <a:t>o </a:t>
-            </a:r>
-            <a:r>
-              <a:rPr sz="1600" spc="45" dirty="0">
-                <a:latin typeface="Trebuchet MS"/>
-                <a:cs typeface="Trebuchet MS"/>
-              </a:rPr>
-              <a:t>separación </a:t>
-            </a:r>
-            <a:r>
-              <a:rPr sz="1600" spc="40" dirty="0">
-                <a:latin typeface="Trebuchet MS"/>
-                <a:cs typeface="Trebuchet MS"/>
-              </a:rPr>
-              <a:t>por </a:t>
-            </a:r>
-            <a:r>
-              <a:rPr sz="1600" spc="55" dirty="0">
-                <a:latin typeface="Trebuchet MS"/>
-                <a:cs typeface="Trebuchet MS"/>
-              </a:rPr>
-              <a:t>punto </a:t>
-            </a:r>
-            <a:r>
-              <a:rPr sz="1600" spc="40" dirty="0">
-                <a:latin typeface="Trebuchet MS"/>
-                <a:cs typeface="Trebuchet MS"/>
-              </a:rPr>
-              <a:t>describiendo </a:t>
-            </a:r>
-            <a:r>
-              <a:rPr sz="1600" spc="45" dirty="0">
-                <a:latin typeface="Trebuchet MS"/>
-                <a:cs typeface="Trebuchet MS"/>
-              </a:rPr>
-              <a:t>(máximo </a:t>
-            </a:r>
-            <a:r>
-              <a:rPr sz="1600" spc="85" dirty="0">
-                <a:latin typeface="Trebuchet MS"/>
-                <a:cs typeface="Trebuchet MS"/>
-              </a:rPr>
-              <a:t>6 </a:t>
-            </a:r>
-            <a:r>
-              <a:rPr sz="1600" spc="25" dirty="0">
-                <a:latin typeface="Trebuchet MS"/>
-                <a:cs typeface="Trebuchet MS"/>
-              </a:rPr>
-              <a:t>líneas </a:t>
-            </a:r>
-            <a:r>
-              <a:rPr sz="1600" spc="45" dirty="0">
-                <a:latin typeface="Trebuchet MS"/>
-                <a:cs typeface="Trebuchet MS"/>
-              </a:rPr>
-              <a:t>por</a:t>
-            </a:r>
-            <a:r>
-              <a:rPr sz="1600" spc="-260" dirty="0">
-                <a:latin typeface="Trebuchet MS"/>
-                <a:cs typeface="Trebuchet MS"/>
-              </a:rPr>
-              <a:t> </a:t>
-            </a:r>
-            <a:r>
-              <a:rPr sz="1600" spc="-15" dirty="0">
-                <a:latin typeface="Trebuchet MS"/>
-                <a:cs typeface="Trebuchet MS"/>
-              </a:rPr>
-              <a:t>párrafo):</a:t>
-            </a:r>
-            <a:endParaRPr sz="1600" dirty="0">
-              <a:latin typeface="Trebuchet MS"/>
-              <a:cs typeface="Trebuchet MS"/>
-            </a:endParaRPr>
-          </a:p>
           <a:p>
             <a:pPr>
               <a:lnSpc>
@@ -5091,12 +4872,10 @@
             </a:endParaRPr>
           </a:p>
           <a:p>
-            <a:pPr marL="298450" indent="-285750">
+            <a:pPr marL="12700">
               <a:lnSpc>
                 <a:spcPct val="100000"/>
               </a:lnSpc>
-              <a:buFont typeface="Arial"/>
-              <a:buChar char="•"/>
               <a:tabLst>
                 <a:tab pos="297815" algn="l"/>
                 <a:tab pos="298450" algn="l"/>
@@ -5138,16 +4917,7 @@
               <a:lnSpc>
                 <a:spcPct val="100000"/>
               </a:lnSpc>
-              <a:buFont typeface="Arial"/>
-              <a:buChar char="•"/>
             </a:pPr>
-            <a:r>
-              <a:rPr lang="es-MX" sz="1650" dirty="0">
-                <a:latin typeface="Trebuchet MS"/>
-                <a:cs typeface="Trebuchet MS"/>
-              </a:rPr>
-              <a:t>   </a:t>
-            </a:r>
             <a:r>
               <a:rPr lang="es-MX" sz="1600" dirty="0">
                 <a:latin typeface="Trebuchet MS"/>
@@ -5175,15 +4945,13 @@
             </a:endParaRPr>
           </a:p>
           <a:p>
-            <a:pPr marL="298450" marR="273685" indent="-285750">
+            <a:pPr marL="12700" marR="273685">
               <a:lnSpc>
                 <a:spcPct val="100000"/>
               </a:lnSpc>
               <a:spcBef>
                 <a:spcPts val="5"/>
               </a:spcBef>
-              <a:buFont typeface="Arial"/>
-              <a:buChar char="•"/>
               <a:tabLst>
                 <a:tab pos="297815" algn="l"/>
                 <a:tab pos="298450" algn="l"/>
@@ -5268,18 +5036,16 @@
               <a:buFont typeface="Arial"/>
               <a:buChar char="•"/>
             </a:pPr>
-            <a:endParaRPr sz="1650" dirty="0">
+            <a:endParaRPr lang="es-CO" sz="1650" dirty="0">
               <a:latin typeface="Trebuchet MS"/>
               <a:cs typeface="Trebuchet MS"/>
             </a:endParaRPr>
           </a:p>
           <a:p>
-            <a:pPr marL="298450" marR="883285" indent="-285750" algn="just">
+            <a:pPr marL="12700" marR="883285" algn="just">
               <a:lnSpc>
                 <a:spcPct val="100000"/>
               </a:lnSpc>
-              <a:buFont typeface="Arial"/>
-              <a:buChar char="•"/>
               <a:tabLst>
                 <a:tab pos="298450" algn="l"/>
               </a:tabLst>
@@ -6236,7 +6002,7 @@
         <p:spPr>
           <a:xfrm>
             <a:off x="843025" y="3684016"/>
-            <a:ext cx="4653915" cy="1982594"/>
+            <a:ext cx="4653915" cy="2228815"/>
           </a:xfrm>
           <a:prstGeom prst="rect">
             <a:avLst/>
@@ -6277,46 +6043,39 @@
               <a:t>los </a:t>
             </a:r>
             <a:r>
+              <a:rPr sz="1600" spc="55" dirty="0" err="1">
+                <a:latin typeface="Trebuchet MS"/>
+                <a:cs typeface="Trebuchet MS"/>
+              </a:rPr>
+              <a:t>Usuarios</a:t>
+            </a:r>
+            <a:r>
               <a:rPr sz="1600" spc="55" dirty="0">
                 <a:latin typeface="Trebuchet MS"/>
                 <a:cs typeface="Trebuchet MS"/>
               </a:rPr>
-              <a:t>Usuarios </a:t>
+              <a:t> </a:t>
             </a:r>
             <a:r>
               <a:rPr sz="1600" spc="50" dirty="0">
                 <a:latin typeface="Trebuchet MS"/>
                 <a:cs typeface="Trebuchet MS"/>
               </a:rPr>
-              <a:t>de </a:t>
-            </a:r>
-            <a:r>
-              <a:rPr sz="1600" spc="-5" dirty="0">
-                <a:latin typeface="Trebuchet MS"/>
-                <a:cs typeface="Trebuchet MS"/>
-              </a:rPr>
-              <a:t>la</a:t>
-            </a:r>
-            <a:r>
-              <a:rPr sz="1600" spc="-170" dirty="0">
+              <a:t>de</a:t>
+            </a:r>
+            <a:r>
+              <a:rPr lang="es-MX" sz="1600" spc="50" dirty="0">
+                <a:latin typeface="Trebuchet MS"/>
+                <a:cs typeface="Trebuchet MS"/>
+              </a:rPr>
+              <a:t>l</a:t>
+            </a:r>
+            <a:r>
+              <a:rPr sz="1600" spc="50" dirty="0">
                 <a:latin typeface="Trebuchet MS"/>
                 <a:cs typeface="Trebuchet MS"/>
               </a:rPr>
               <a:t> </a:t>
-            </a:r>
-            <a:r>
-              <a:rPr sz="1600" spc="85" dirty="0" err="1">
-                <a:latin typeface="Trebuchet MS"/>
-                <a:cs typeface="Trebuchet MS"/>
-              </a:rPr>
-              <a:t>Empresa</a:t>
-            </a:r>
-            <a:r>
-              <a:rPr sz="1600" spc="85" dirty="0">
-                <a:latin typeface="Trebuchet MS"/>
-                <a:cs typeface="Trebuchet MS"/>
-              </a:rPr>
-              <a:t>  </a:t>
             </a:r>
             <a:r>
               <a:rPr lang="es-MX" sz="1600" spc="55" dirty="0">
@@ -6382,28 +6141,21 @@
                 <a:latin typeface="Trebuchet MS"/>
                 <a:cs typeface="Trebuchet MS"/>
               </a:rPr>
-              <a:t>de </a:t>
-            </a:r>
-            <a:r>
-              <a:rPr sz="1600" spc="-5" dirty="0">
-                <a:latin typeface="Trebuchet MS"/>
-                <a:cs typeface="Trebuchet MS"/>
-              </a:rPr>
-              <a:t>la</a:t>
-            </a:r>
-            <a:r>
-              <a:rPr sz="1600" spc="-120" dirty="0">
-                <a:latin typeface="Trebuchet MS"/>
-                <a:cs typeface="Trebuchet MS"/>
-              </a:rPr>
-              <a:t> </a:t>
-            </a:r>
-            <a:r>
-              <a:rPr sz="1600" spc="85" dirty="0" err="1">
-                <a:latin typeface="Trebuchet MS"/>
-                <a:cs typeface="Trebuchet MS"/>
-              </a:rPr>
-              <a:t>Empresa</a:t>
+              <a:t>de</a:t>
+            </a:r>
+            <a:r>
+              <a:rPr lang="es-MX" sz="1600" spc="50" dirty="0">
+                <a:latin typeface="Trebuchet MS"/>
+                <a:cs typeface="Trebuchet MS"/>
+              </a:rPr>
+              <a:t>l </a:t>
+            </a:r>
+            <a:r>
+              <a:rPr lang="es-MX" sz="1600" spc="55" dirty="0">
+                <a:latin typeface="Trebuchet MS"/>
+                <a:cs typeface="Trebuchet MS"/>
+              </a:rPr>
+              <a:t>Restaurante Betel</a:t>
             </a:r>
             <a:r>
               <a:rPr lang="es-MX" sz="1600" spc="85" dirty="0">
@@ -6746,7 +6498,7 @@
         <p:spPr>
           <a:xfrm>
             <a:off x="451104" y="1690877"/>
-            <a:ext cx="11175365" cy="4960332"/>
+            <a:ext cx="11175365" cy="4467890"/>
           </a:xfrm>
           <a:prstGeom prst="rect">
             <a:avLst/>
@@ -6757,97 +6509,6 @@
             <a:spAutoFit/>
           </a:bodyPr>
           <a:lstStyle/>
-          <a:p>
-            <a:pPr marL="12700">
-              <a:lnSpc>
-                <a:spcPct val="100000"/>
-              </a:lnSpc>
-              <a:spcBef>
-                <a:spcPts val="100"/>
-              </a:spcBef>
-            </a:pPr>
-            <a:r>
-              <a:rPr sz="1600" spc="15" dirty="0">
-                <a:latin typeface="Trebuchet MS"/>
-                <a:cs typeface="Trebuchet MS"/>
-              </a:rPr>
-              <a:t>Párrafo </a:t>
-            </a:r>
-            <a:r>
-              <a:rPr sz="1600" spc="75" dirty="0">
-                <a:latin typeface="Trebuchet MS"/>
-                <a:cs typeface="Trebuchet MS"/>
-              </a:rPr>
-              <a:t>o </a:t>
-            </a:r>
-            <a:r>
-              <a:rPr sz="1600" spc="45" dirty="0">
-                <a:latin typeface="Trebuchet MS"/>
-                <a:cs typeface="Trebuchet MS"/>
-              </a:rPr>
-              <a:t>separación por </a:t>
-            </a:r>
-            <a:r>
-              <a:rPr sz="1600" spc="55" dirty="0">
-                <a:latin typeface="Trebuchet MS"/>
-                <a:cs typeface="Trebuchet MS"/>
-              </a:rPr>
-              <a:t>punto </a:t>
-            </a:r>
-            <a:r>
-              <a:rPr sz="1600" spc="40" dirty="0">
-                <a:latin typeface="Trebuchet MS"/>
-                <a:cs typeface="Trebuchet MS"/>
-              </a:rPr>
-              <a:t>describiendo </a:t>
-            </a:r>
-            <a:r>
-              <a:rPr sz="1600" spc="45" dirty="0">
-                <a:latin typeface="Trebuchet MS"/>
-                <a:cs typeface="Trebuchet MS"/>
-              </a:rPr>
-              <a:t>(máximo </a:t>
-            </a:r>
-            <a:r>
-              <a:rPr sz="1600" spc="85" dirty="0">
-                <a:latin typeface="Trebuchet MS"/>
-                <a:cs typeface="Trebuchet MS"/>
-              </a:rPr>
-              <a:t>6 </a:t>
-            </a:r>
-            <a:r>
-              <a:rPr sz="1600" spc="25" dirty="0">
-                <a:latin typeface="Trebuchet MS"/>
-                <a:cs typeface="Trebuchet MS"/>
-              </a:rPr>
-              <a:t>líneas </a:t>
-            </a:r>
-            <a:r>
-              <a:rPr sz="1600" spc="45" dirty="0">
-                <a:latin typeface="Trebuchet MS"/>
-                <a:cs typeface="Trebuchet MS"/>
-              </a:rPr>
-              <a:t>por</a:t>
-            </a:r>
-            <a:r>
-              <a:rPr sz="1600" spc="-270" dirty="0">
-                <a:latin typeface="Trebuchet MS"/>
-                <a:cs typeface="Trebuchet MS"/>
-              </a:rPr>
-              <a:t> </a:t>
-            </a:r>
-            <a:r>
-              <a:rPr sz="1600" spc="-15" dirty="0">
-                <a:latin typeface="Trebuchet MS"/>
-                <a:cs typeface="Trebuchet MS"/>
-              </a:rPr>
-              <a:t>párrafo):</a:t>
-            </a:r>
-            <a:endParaRPr sz="1600" dirty="0">
-              <a:latin typeface="Trebuchet MS"/>
-              <a:cs typeface="Trebuchet MS"/>
-            </a:endParaRPr>
-          </a:p>
           <a:p>
             <a:pPr>
               <a:lnSpc>
@@ -6863,45 +6524,15 @@
             </a:endParaRPr>
           </a:p>
           <a:p>
-            <a:pPr marL="298450" marR="48260" indent="-285750">
+            <a:pPr marL="12700" marR="48260">
               <a:lnSpc>
                 <a:spcPct val="100000"/>
               </a:lnSpc>
-              <a:buFont typeface="Arial"/>
-              <a:buChar char="•"/>
               <a:tabLst>
                 <a:tab pos="297815" algn="l"/>
                 <a:tab pos="298450" algn="l"/>
               </a:tabLst>
             </a:pPr>
-            <a:r>
-              <a:rPr sz="1600" spc="65" dirty="0">
-                <a:latin typeface="Trebuchet MS"/>
-                <a:cs typeface="Trebuchet MS"/>
-              </a:rPr>
-              <a:t>La</a:t>
-            </a:r>
-            <a:r>
-              <a:rPr sz="1600" spc="20" dirty="0">
-                <a:latin typeface="Trebuchet MS"/>
-                <a:cs typeface="Trebuchet MS"/>
-              </a:rPr>
-              <a:t> </a:t>
-            </a:r>
-            <a:r>
-              <a:rPr sz="1600" spc="25" dirty="0">
-                <a:latin typeface="Trebuchet MS"/>
-                <a:cs typeface="Trebuchet MS"/>
-              </a:rPr>
-              <a:t>solución:</a:t>
-            </a:r>
-            <a:r>
-              <a:rPr sz="1600" spc="40" dirty="0">
-                <a:latin typeface="Trebuchet MS"/>
-                <a:cs typeface="Trebuchet MS"/>
-              </a:rPr>
-              <a:t> </a:t>
-            </a:r>
             <a:r>
               <a:rPr sz="1600" spc="120" dirty="0">
                 <a:latin typeface="Trebuchet MS"/>
@@ -7260,12 +6891,10 @@
             </a:endParaRPr>
           </a:p>
           <a:p>
-            <a:pPr marL="298450" marR="123825" indent="-285750">
+            <a:pPr marL="12700" marR="123825">
               <a:lnSpc>
                 <a:spcPct val="100000"/>
               </a:lnSpc>
-              <a:buFont typeface="Arial"/>
-              <a:buChar char="•"/>
               <a:tabLst>
                 <a:tab pos="297815" algn="l"/>
                 <a:tab pos="298450" algn="l"/>
@@ -7416,7 +7045,7 @@
                 <a:latin typeface="Trebuchet MS"/>
                 <a:cs typeface="Trebuchet MS"/>
               </a:rPr>
-              <a:t> INVENTARIOS </a:t>
+              <a:t> inventarios </a:t>
             </a:r>
             <a:r>
               <a:rPr sz="1600" spc="25" dirty="0">
@@ -8000,12 +7629,10 @@
             </a:endParaRPr>
           </a:p>
           <a:p>
-            <a:pPr marL="298450" marR="5080" indent="-285750">
+            <a:pPr marL="12700" marR="5080">
               <a:lnSpc>
                 <a:spcPct val="100000"/>
               </a:lnSpc>
-              <a:buFont typeface="Arial"/>
-              <a:buChar char="•"/>
               <a:tabLst>
                 <a:tab pos="297815" algn="l"/>
                 <a:tab pos="298450" algn="l"/>
@@ -8323,7 +7950,7 @@
         <p:spPr>
           <a:xfrm>
             <a:off x="451104" y="1690877"/>
-            <a:ext cx="11095355" cy="1759456"/>
+            <a:ext cx="11095355" cy="1513235"/>
           </a:xfrm>
           <a:prstGeom prst="rect">
             <a:avLst/>
@@ -8334,97 +7961,6 @@
             <a:spAutoFit/>
           </a:bodyPr>
           <a:lstStyle/>
-          <a:p>
-            <a:pPr marL="12700">
-              <a:lnSpc>
-                <a:spcPct val="100000"/>
-              </a:lnSpc>
-              <a:spcBef>
-                <a:spcPts val="100"/>
-              </a:spcBef>
-            </a:pPr>
-            <a:r>
-              <a:rPr sz="1600" spc="15" dirty="0">
-                <a:latin typeface="Trebuchet MS"/>
-                <a:cs typeface="Trebuchet MS"/>
-              </a:rPr>
-              <a:t>Párrafo </a:t>
-            </a:r>
-            <a:r>
-              <a:rPr sz="1600" spc="75" dirty="0">
-                <a:latin typeface="Trebuchet MS"/>
-                <a:cs typeface="Trebuchet MS"/>
-              </a:rPr>
-              <a:t>o </a:t>
-            </a:r>
-            <a:r>
-              <a:rPr sz="1600" spc="45" dirty="0">
-                <a:latin typeface="Trebuchet MS"/>
-                <a:cs typeface="Trebuchet MS"/>
-              </a:rPr>
-              <a:t>separación por </a:t>
-            </a:r>
-            <a:r>
-              <a:rPr sz="1600" spc="55" dirty="0">
-                <a:latin typeface="Trebuchet MS"/>
-                <a:cs typeface="Trebuchet MS"/>
-              </a:rPr>
-              <a:t>punto </a:t>
-            </a:r>
-            <a:r>
-              <a:rPr sz="1600" spc="40" dirty="0">
-                <a:latin typeface="Trebuchet MS"/>
-                <a:cs typeface="Trebuchet MS"/>
-              </a:rPr>
-              <a:t>describiendo </a:t>
-            </a:r>
-            <a:r>
-              <a:rPr sz="1600" spc="45" dirty="0">
-                <a:latin typeface="Trebuchet MS"/>
-                <a:cs typeface="Trebuchet MS"/>
-              </a:rPr>
-              <a:t>(máximo </a:t>
-            </a:r>
-            <a:r>
-              <a:rPr sz="1600" spc="85" dirty="0">
-                <a:latin typeface="Trebuchet MS"/>
-                <a:cs typeface="Trebuchet MS"/>
-              </a:rPr>
-              <a:t>6 </a:t>
-            </a:r>
-            <a:r>
-              <a:rPr sz="1600" spc="25" dirty="0">
-                <a:latin typeface="Trebuchet MS"/>
-                <a:cs typeface="Trebuchet MS"/>
-              </a:rPr>
-              <a:t>líneas </a:t>
-            </a:r>
-            <a:r>
-              <a:rPr sz="1600" spc="45" dirty="0">
-                <a:latin typeface="Trebuchet MS"/>
-                <a:cs typeface="Trebuchet MS"/>
-              </a:rPr>
-              <a:t>por</a:t>
-            </a:r>
-            <a:r>
-              <a:rPr sz="1600" spc="-270" dirty="0">
-                <a:latin typeface="Trebuchet MS"/>
-                <a:cs typeface="Trebuchet MS"/>
-              </a:rPr>
-              <a:t> </a:t>
-            </a:r>
-            <a:r>
-              <a:rPr sz="1600" spc="-15" dirty="0">
-                <a:latin typeface="Trebuchet MS"/>
-                <a:cs typeface="Trebuchet MS"/>
-              </a:rPr>
-              <a:t>párrafo):</a:t>
-            </a:r>
-            <a:endParaRPr sz="1600" dirty="0">
-              <a:latin typeface="Trebuchet MS"/>
-              <a:cs typeface="Trebuchet MS"/>
-            </a:endParaRPr>
-          </a:p>
           <a:p>
             <a:pPr>
               <a:lnSpc>
@@ -8440,12 +7976,10 @@
             </a:endParaRPr>
           </a:p>
           <a:p>
-            <a:pPr marL="298450" indent="-285750">
+            <a:pPr marL="12700">
               <a:lnSpc>
                 <a:spcPct val="100000"/>
               </a:lnSpc>
-              <a:buFont typeface="Arial"/>
-              <a:buChar char="•"/>
               <a:tabLst>
                 <a:tab pos="297815" algn="l"/>
                 <a:tab pos="298450" algn="l"/>
@@ -8536,12 +8070,10 @@
             </a:endParaRPr>
           </a:p>
           <a:p>
-            <a:pPr marL="298450" indent="-285750">
+            <a:pPr marL="12700">
               <a:lnSpc>
                 <a:spcPct val="100000"/>
               </a:lnSpc>
-              <a:buFont typeface="Arial"/>
-              <a:buChar char="•"/>
               <a:tabLst>
                 <a:tab pos="297815" algn="l"/>
                 <a:tab pos="298450" algn="l"/>

</xml_diff>